<commit_message>
ppt for week 4
</commit_message>
<xml_diff>
--- a/week4/Photodetachment Rate at Saturn - Draft.pptx
+++ b/week4/Photodetachment Rate at Saturn - Draft.pptx
@@ -21,6 +21,11 @@
     <p:sldId id="284" r:id="rId16"/>
     <p:sldId id="288" r:id="rId17"/>
     <p:sldId id="283" r:id="rId18"/>
+    <p:sldId id="291" r:id="rId19"/>
+    <p:sldId id="296" r:id="rId20"/>
+    <p:sldId id="293" r:id="rId21"/>
+    <p:sldId id="295" r:id="rId22"/>
+    <p:sldId id="297" r:id="rId23"/>
   </p:sldIdLst>
   <p:sldSz cx="12192000" cy="6858000"/>
   <p:notesSz cx="6858000" cy="9144000"/>
@@ -5108,6 +5113,449 @@
 </p:sld>
 </file>
 
+<file path=ppt/slides/slide17.xml><?xml version="1.0" encoding="utf-8"?>
+<p:sld xmlns:a="http://schemas.openxmlformats.org/drawingml/2006/main" xmlns:r="http://schemas.openxmlformats.org/officeDocument/2006/relationships" xmlns:p="http://schemas.openxmlformats.org/presentationml/2006/main">
+  <p:cSld>
+    <p:spTree>
+      <p:nvGrpSpPr>
+        <p:cNvPr id="1" name=""/>
+        <p:cNvGrpSpPr/>
+        <p:nvPr/>
+      </p:nvGrpSpPr>
+      <p:grpSpPr/>
+      <p:sp>
+        <p:nvSpPr>
+          <p:cNvPr id="2" name="标题 1"/>
+          <p:cNvSpPr>
+            <a:spLocks noGrp="1"/>
+          </p:cNvSpPr>
+          <p:nvPr>
+            <p:ph type="title"/>
+          </p:nvPr>
+        </p:nvSpPr>
+        <p:spPr/>
+        <p:txBody>
+          <a:bodyPr/>
+          <a:p>
+            <a:r>
+              <a:rPr lang="en-US" altLang="zh-CN"/>
+              <a:t>4th Week (5.31-6.7)</a:t>
+            </a:r>
+            <a:endParaRPr lang="en-US" altLang="zh-CN"/>
+          </a:p>
+        </p:txBody>
+      </p:sp>
+      <p:sp>
+        <p:nvSpPr>
+          <p:cNvPr id="3" name="内容占位符 2"/>
+          <p:cNvSpPr>
+            <a:spLocks noGrp="1"/>
+          </p:cNvSpPr>
+          <p:nvPr>
+            <p:ph idx="1"/>
+          </p:nvPr>
+        </p:nvSpPr>
+        <p:spPr/>
+        <p:txBody>
+          <a:bodyPr/>
+          <a:p>
+            <a:r>
+              <a:rPr lang="en-US" altLang="zh-CN"/>
+              <a:t>Aim:</a:t>
+            </a:r>
+            <a:endParaRPr lang="en-US" altLang="zh-CN"/>
+          </a:p>
+          <a:p>
+            <a:r>
+              <a:rPr lang="en-US" altLang="zh-CN"/>
+              <a:t>Reaction coefficient of collision of electron &amp; neutral atoms</a:t>
+            </a:r>
+            <a:r>
+              <a:rPr lang="zh-CN" altLang="en-US"/>
+              <a:t>：</a:t>
+            </a:r>
+            <a:endParaRPr lang="zh-CN" altLang="en-US"/>
+          </a:p>
+          <a:p>
+            <a:pPr marL="0" indent="0">
+              <a:buNone/>
+            </a:pPr>
+            <a:r>
+              <a:rPr lang="en-US" altLang="zh-CN"/>
+              <a:t>   e + H2O, e + O2</a:t>
+            </a:r>
+            <a:endParaRPr lang="en-US" altLang="zh-CN"/>
+          </a:p>
+          <a:p>
+            <a:pPr marL="0" indent="0">
+              <a:buNone/>
+            </a:pPr>
+            <a:endParaRPr lang="en-US" altLang="zh-CN"/>
+          </a:p>
+          <a:p>
+            <a:pPr marL="0" indent="0">
+              <a:buNone/>
+            </a:pPr>
+            <a:endParaRPr lang="en-US" altLang="zh-CN"/>
+          </a:p>
+          <a:p>
+            <a:pPr marL="0" indent="0">
+              <a:buNone/>
+            </a:pPr>
+            <a:endParaRPr lang="en-US" altLang="zh-CN"/>
+          </a:p>
+          <a:p>
+            <a:pPr marL="0" indent="0">
+              <a:buNone/>
+            </a:pPr>
+            <a:endParaRPr lang="en-US" altLang="zh-CN"/>
+          </a:p>
+        </p:txBody>
+      </p:sp>
+    </p:spTree>
+  </p:cSld>
+  <p:clrMapOvr>
+    <a:masterClrMapping/>
+  </p:clrMapOvr>
+</p:sld>
+</file>
+
+<file path=ppt/slides/slide18.xml><?xml version="1.0" encoding="utf-8"?>
+<p:sld xmlns:a="http://schemas.openxmlformats.org/drawingml/2006/main" xmlns:r="http://schemas.openxmlformats.org/officeDocument/2006/relationships" xmlns:p="http://schemas.openxmlformats.org/presentationml/2006/main">
+  <p:cSld>
+    <p:spTree>
+      <p:nvGrpSpPr>
+        <p:cNvPr id="1" name=""/>
+        <p:cNvGrpSpPr/>
+        <p:nvPr/>
+      </p:nvGrpSpPr>
+      <p:grpSpPr/>
+      <p:pic>
+        <p:nvPicPr>
+          <p:cNvPr id="7" name="图片 6" descr="OH"/>
+          <p:cNvPicPr>
+            <a:picLocks noChangeAspect="1"/>
+          </p:cNvPicPr>
+          <p:nvPr/>
+        </p:nvPicPr>
+        <p:blipFill>
+          <a:blip r:embed="rId1"/>
+          <a:stretch>
+            <a:fillRect/>
+          </a:stretch>
+        </p:blipFill>
+        <p:spPr>
+          <a:xfrm>
+            <a:off x="1254125" y="3258185"/>
+            <a:ext cx="4324350" cy="2882900"/>
+          </a:xfrm>
+          <a:prstGeom prst="rect">
+            <a:avLst/>
+          </a:prstGeom>
+        </p:spPr>
+      </p:pic>
+      <p:pic>
+        <p:nvPicPr>
+          <p:cNvPr id="8" name="图片 7" descr="O-"/>
+          <p:cNvPicPr>
+            <a:picLocks noChangeAspect="1"/>
+          </p:cNvPicPr>
+          <p:nvPr/>
+        </p:nvPicPr>
+        <p:blipFill>
+          <a:blip r:embed="rId2"/>
+          <a:stretch>
+            <a:fillRect/>
+          </a:stretch>
+        </p:blipFill>
+        <p:spPr>
+          <a:xfrm>
+            <a:off x="6398895" y="364490"/>
+            <a:ext cx="4340225" cy="2893695"/>
+          </a:xfrm>
+          <a:prstGeom prst="rect">
+            <a:avLst/>
+          </a:prstGeom>
+        </p:spPr>
+      </p:pic>
+      <p:pic>
+        <p:nvPicPr>
+          <p:cNvPr id="9" name="图片 8" descr="O2O-"/>
+          <p:cNvPicPr>
+            <a:picLocks noChangeAspect="1"/>
+          </p:cNvPicPr>
+          <p:nvPr/>
+        </p:nvPicPr>
+        <p:blipFill>
+          <a:blip r:embed="rId3"/>
+          <a:stretch>
+            <a:fillRect/>
+          </a:stretch>
+        </p:blipFill>
+        <p:spPr>
+          <a:xfrm>
+            <a:off x="6398895" y="3247390"/>
+            <a:ext cx="4340225" cy="2893695"/>
+          </a:xfrm>
+          <a:prstGeom prst="rect">
+            <a:avLst/>
+          </a:prstGeom>
+        </p:spPr>
+      </p:pic>
+      <p:sp>
+        <p:nvSpPr>
+          <p:cNvPr id="10" name="文本占位符 9"/>
+          <p:cNvSpPr>
+            <a:spLocks noGrp="1"/>
+          </p:cNvSpPr>
+          <p:nvPr>
+            <p:ph type="body" sz="half" idx="2"/>
+          </p:nvPr>
+        </p:nvSpPr>
+        <p:spPr>
+          <a:xfrm>
+            <a:off x="840105" y="2057400"/>
+            <a:ext cx="4738370" cy="3221990"/>
+          </a:xfrm>
+        </p:spPr>
+        <p:txBody>
+          <a:bodyPr>
+            <a:normAutofit lnSpcReduction="20000"/>
+          </a:bodyPr>
+          <a:p>
+            <a:r>
+              <a:rPr lang="en-US" altLang="zh-CN" sz="1600"/>
+              <a:t>Cross section for inelastic collision for each chemical</a:t>
+            </a:r>
+            <a:endParaRPr lang="en-US" altLang="zh-CN" sz="1600"/>
+          </a:p>
+          <a:p>
+            <a:pPr marL="0" indent="0">
+              <a:buNone/>
+            </a:pPr>
+            <a:endParaRPr lang="en-US" altLang="zh-CN" sz="1600"/>
+          </a:p>
+        </p:txBody>
+      </p:sp>
+      <p:sp>
+        <p:nvSpPr>
+          <p:cNvPr id="11" name="标题 10"/>
+          <p:cNvSpPr>
+            <a:spLocks noGrp="1"/>
+          </p:cNvSpPr>
+          <p:nvPr>
+            <p:ph type="title"/>
+          </p:nvPr>
+        </p:nvSpPr>
+        <p:spPr>
+          <a:xfrm>
+            <a:off x="840105" y="457200"/>
+            <a:ext cx="4554220" cy="1600200"/>
+          </a:xfrm>
+        </p:spPr>
+        <p:txBody>
+          <a:bodyPr/>
+          <a:p>
+            <a:r>
+              <a:rPr lang="en-US" altLang="zh-CN" sz="3200"/>
+              <a:t>Cross section plot</a:t>
+            </a:r>
+            <a:endParaRPr lang="en-US" altLang="zh-CN" sz="3200"/>
+          </a:p>
+        </p:txBody>
+      </p:sp>
+    </p:spTree>
+  </p:cSld>
+  <p:clrMapOvr>
+    <a:masterClrMapping/>
+  </p:clrMapOvr>
+</p:sld>
+</file>
+
+<file path=ppt/slides/slide19.xml><?xml version="1.0" encoding="utf-8"?>
+<p:sld xmlns:a="http://schemas.openxmlformats.org/drawingml/2006/main" xmlns:r="http://schemas.openxmlformats.org/officeDocument/2006/relationships" xmlns:p="http://schemas.openxmlformats.org/presentationml/2006/main">
+  <p:cSld>
+    <p:spTree>
+      <p:nvGrpSpPr>
+        <p:cNvPr id="1" name=""/>
+        <p:cNvGrpSpPr/>
+        <p:nvPr/>
+      </p:nvGrpSpPr>
+      <p:grpSpPr/>
+      <p:sp>
+        <p:nvSpPr>
+          <p:cNvPr id="7" name="标题 6"/>
+          <p:cNvSpPr>
+            <a:spLocks noGrp="1"/>
+          </p:cNvSpPr>
+          <p:nvPr>
+            <p:ph type="title"/>
+          </p:nvPr>
+        </p:nvSpPr>
+        <p:spPr>
+          <a:xfrm>
+            <a:off x="840105" y="457200"/>
+            <a:ext cx="4554220" cy="1600200"/>
+          </a:xfrm>
+        </p:spPr>
+        <p:txBody>
+          <a:bodyPr/>
+          <a:p>
+            <a:r>
+              <a:rPr lang="en-US" altLang="zh-CN" sz="3200"/>
+              <a:t>Collision rate coefficient</a:t>
+            </a:r>
+            <a:endParaRPr lang="en-US" altLang="zh-CN" sz="3200"/>
+          </a:p>
+        </p:txBody>
+      </p:sp>
+      <p:sp>
+        <p:nvSpPr>
+          <p:cNvPr id="8" name="文本占位符 7"/>
+          <p:cNvSpPr>
+            <a:spLocks noGrp="1"/>
+          </p:cNvSpPr>
+          <p:nvPr>
+            <p:ph type="body" sz="half" idx="2"/>
+          </p:nvPr>
+        </p:nvSpPr>
+        <p:spPr>
+          <a:xfrm>
+            <a:off x="840105" y="2057400"/>
+            <a:ext cx="4738370" cy="3221990"/>
+          </a:xfrm>
+        </p:spPr>
+        <p:txBody>
+          <a:bodyPr>
+            <a:normAutofit lnSpcReduction="20000"/>
+          </a:bodyPr>
+          <a:p>
+            <a:r>
+              <a:rPr lang="en-US" altLang="zh-CN" sz="1600"/>
+              <a:t>Formula used: on the right</a:t>
+            </a:r>
+            <a:endParaRPr lang="en-US" altLang="zh-CN" sz="1600"/>
+          </a:p>
+          <a:p>
+            <a:pPr marL="0" indent="0">
+              <a:buNone/>
+            </a:pPr>
+            <a:endParaRPr lang="en-US" altLang="zh-CN" sz="1600"/>
+          </a:p>
+          <a:p>
+            <a:r>
+              <a:rPr lang="en-US" altLang="zh-CN" sz="1600"/>
+              <a:t>&lt;ve&gt; = mean electron velocity (calculated from T)</a:t>
+            </a:r>
+            <a:endParaRPr lang="en-US" altLang="zh-CN" sz="1600"/>
+          </a:p>
+          <a:p>
+            <a:r>
+              <a:rPr lang="en-US" altLang="zh-CN" sz="1600"/>
+              <a:t>sigma = cross section for inelastic scattering</a:t>
+            </a:r>
+            <a:endParaRPr lang="en-US" altLang="zh-CN" sz="1600"/>
+          </a:p>
+          <a:p>
+            <a:r>
+              <a:rPr lang="en-US" altLang="zh-CN" sz="1600"/>
+              <a:t>f(v) = Boltzman distribution function</a:t>
+            </a:r>
+            <a:endParaRPr lang="en-US" altLang="zh-CN" sz="1600"/>
+          </a:p>
+          <a:p>
+            <a:pPr marL="0" indent="0">
+              <a:buNone/>
+            </a:pPr>
+            <a:endParaRPr lang="en-US" altLang="zh-CN" sz="1600"/>
+          </a:p>
+        </p:txBody>
+      </p:sp>
+      <p:pic>
+        <p:nvPicPr>
+          <p:cNvPr id="2" name="图片 1" descr="productionrate"/>
+          <p:cNvPicPr>
+            <a:picLocks noChangeAspect="1"/>
+          </p:cNvPicPr>
+          <p:nvPr/>
+        </p:nvPicPr>
+        <p:blipFill>
+          <a:blip r:embed="rId1"/>
+          <a:stretch>
+            <a:fillRect/>
+          </a:stretch>
+        </p:blipFill>
+        <p:spPr>
+          <a:xfrm>
+            <a:off x="5885180" y="3586480"/>
+            <a:ext cx="5455920" cy="1494155"/>
+          </a:xfrm>
+          <a:prstGeom prst="rect">
+            <a:avLst/>
+          </a:prstGeom>
+        </p:spPr>
+      </p:pic>
+      <p:graphicFrame>
+        <p:nvGraphicFramePr>
+          <p:cNvPr id="4" name="对象 3">
+            <a:hlinkClick r:id="" action="ppaction://ole?verb="/>
+          </p:cNvPr>
+          <p:cNvGraphicFramePr>
+            <a:graphicFrameLocks noChangeAspect="1"/>
+          </p:cNvGraphicFramePr>
+          <p:nvPr/>
+        </p:nvGraphicFramePr>
+        <p:xfrm>
+          <a:off x="6238875" y="1959610"/>
+          <a:ext cx="3980180" cy="1004570"/>
+        </p:xfrm>
+        <a:graphic>
+          <a:graphicData uri="http://schemas.openxmlformats.org/presentationml/2006/ole">
+            <mc:AlternateContent xmlns:mc="http://schemas.openxmlformats.org/markup-compatibility/2006">
+              <mc:Choice xmlns:v="urn:schemas-microsoft-com:vml" Requires="v">
+                <p:oleObj spid="_x0000_s1026" name="" r:id="rId2" imgW="1358900" imgH="342900" progId="Equation.KSEE3">
+                  <p:embed/>
+                </p:oleObj>
+              </mc:Choice>
+              <mc:Fallback>
+                <p:oleObj name="" r:id="rId2" imgW="1358900" imgH="342900" progId="Equation.KSEE3">
+                  <p:embed/>
+                  <p:pic>
+                    <p:nvPicPr>
+                      <p:cNvPr id="0" name="图片 1025"/>
+                      <p:cNvPicPr/>
+                      <p:nvPr/>
+                    </p:nvPicPr>
+                    <p:blipFill>
+                      <a:blip r:embed="rId3"/>
+                      <a:stretch>
+                        <a:fillRect/>
+                      </a:stretch>
+                    </p:blipFill>
+                    <p:spPr>
+                      <a:xfrm>
+                        <a:off x="6238875" y="1959610"/>
+                        <a:ext cx="3980180" cy="1004570"/>
+                      </a:xfrm>
+                      <a:prstGeom prst="rect">
+                        <a:avLst/>
+                      </a:prstGeom>
+                    </p:spPr>
+                  </p:pic>
+                </p:oleObj>
+              </mc:Fallback>
+            </mc:AlternateContent>
+          </a:graphicData>
+        </a:graphic>
+      </p:graphicFrame>
+    </p:spTree>
+  </p:cSld>
+  <p:clrMapOvr>
+    <a:masterClrMapping/>
+  </p:clrMapOvr>
+</p:sld>
+</file>
+
 <file path=ppt/slides/slide2.xml><?xml version="1.0" encoding="utf-8"?>
 <p:sld xmlns:a="http://schemas.openxmlformats.org/drawingml/2006/main" xmlns:r="http://schemas.openxmlformats.org/officeDocument/2006/relationships" xmlns:p="http://schemas.openxmlformats.org/presentationml/2006/main">
   <p:cSld>
@@ -5197,6 +5645,373 @@
               <a:t>Calculation of reaction rate coefficient of other anions including Cl-, both at Saturn and on Earth.</a:t>
             </a:r>
             <a:endParaRPr lang="en-US" altLang="zh-CN"/>
+          </a:p>
+        </p:txBody>
+      </p:sp>
+    </p:spTree>
+  </p:cSld>
+  <p:clrMapOvr>
+    <a:masterClrMapping/>
+  </p:clrMapOvr>
+</p:sld>
+</file>
+
+<file path=ppt/slides/slide20.xml><?xml version="1.0" encoding="utf-8"?>
+<p:sld xmlns:a="http://schemas.openxmlformats.org/drawingml/2006/main" xmlns:r="http://schemas.openxmlformats.org/officeDocument/2006/relationships" xmlns:p="http://schemas.openxmlformats.org/presentationml/2006/main">
+  <p:cSld>
+    <p:spTree>
+      <p:nvGrpSpPr>
+        <p:cNvPr id="1" name=""/>
+        <p:cNvGrpSpPr/>
+        <p:nvPr/>
+      </p:nvGrpSpPr>
+      <p:grpSpPr/>
+      <p:pic>
+        <p:nvPicPr>
+          <p:cNvPr id="5" name="内容占位符 4"/>
+          <p:cNvPicPr>
+            <a:picLocks noChangeAspect="1"/>
+          </p:cNvPicPr>
+          <p:nvPr>
+            <p:ph idx="1"/>
+          </p:nvPr>
+        </p:nvPicPr>
+        <p:blipFill>
+          <a:blip r:embed="rId1"/>
+          <a:stretch>
+            <a:fillRect/>
+          </a:stretch>
+        </p:blipFill>
+        <p:spPr>
+          <a:xfrm>
+            <a:off x="1062990" y="592455"/>
+            <a:ext cx="9860280" cy="3025140"/>
+          </a:xfrm>
+          <a:prstGeom prst="rect">
+            <a:avLst/>
+          </a:prstGeom>
+        </p:spPr>
+      </p:pic>
+      <p:pic>
+        <p:nvPicPr>
+          <p:cNvPr id="4" name="图片 3"/>
+          <p:cNvPicPr>
+            <a:picLocks noChangeAspect="1"/>
+          </p:cNvPicPr>
+          <p:nvPr/>
+        </p:nvPicPr>
+        <p:blipFill>
+          <a:blip r:embed="rId2"/>
+          <a:stretch>
+            <a:fillRect/>
+          </a:stretch>
+        </p:blipFill>
+        <p:spPr>
+          <a:xfrm>
+            <a:off x="1165225" y="4034790"/>
+            <a:ext cx="9655175" cy="1958340"/>
+          </a:xfrm>
+          <a:prstGeom prst="rect">
+            <a:avLst/>
+          </a:prstGeom>
+        </p:spPr>
+      </p:pic>
+      <p:sp>
+        <p:nvSpPr>
+          <p:cNvPr id="6" name="文本框 5"/>
+          <p:cNvSpPr txBox="1"/>
+          <p:nvPr/>
+        </p:nvSpPr>
+        <p:spPr>
+          <a:xfrm>
+            <a:off x="77470" y="5861685"/>
+            <a:ext cx="4918710" cy="922020"/>
+          </a:xfrm>
+          <a:prstGeom prst="rect">
+            <a:avLst/>
+          </a:prstGeom>
+          <a:noFill/>
+        </p:spPr>
+        <p:txBody>
+          <a:bodyPr wrap="square" rtlCol="0">
+            <a:spAutoFit/>
+          </a:bodyPr>
+          <a:p>
+            <a:r>
+              <a:rPr lang="en-US" altLang="zh-CN">
+                <a:sym typeface="+mn-ea"/>
+              </a:rPr>
+              <a:t>(Collisions and cross sections, </a:t>
+            </a:r>
+            <a:r>
+              <a:rPr lang="en-US" altLang="zh-CN" i="1">
+                <a:sym typeface="+mn-ea"/>
+              </a:rPr>
+              <a:t>Low Pressure Plasma and Microstructuring Technology</a:t>
+            </a:r>
+            <a:r>
+              <a:rPr lang="en-US" altLang="zh-CN">
+                <a:sym typeface="+mn-ea"/>
+              </a:rPr>
+              <a:t>. Franz, G)</a:t>
+            </a:r>
+            <a:endParaRPr lang="en-US" altLang="zh-CN"/>
+          </a:p>
+          <a:p>
+            <a:endParaRPr lang="zh-CN" altLang="en-US"/>
+          </a:p>
+        </p:txBody>
+      </p:sp>
+    </p:spTree>
+  </p:cSld>
+  <p:clrMapOvr>
+    <a:masterClrMapping/>
+  </p:clrMapOvr>
+</p:sld>
+</file>
+
+<file path=ppt/slides/slide21.xml><?xml version="1.0" encoding="utf-8"?>
+<p:sld xmlns:a="http://schemas.openxmlformats.org/drawingml/2006/main" xmlns:r="http://schemas.openxmlformats.org/officeDocument/2006/relationships" xmlns:p="http://schemas.openxmlformats.org/presentationml/2006/main">
+  <p:cSld>
+    <p:spTree>
+      <p:nvGrpSpPr>
+        <p:cNvPr id="1" name=""/>
+        <p:cNvGrpSpPr/>
+        <p:nvPr/>
+      </p:nvGrpSpPr>
+      <p:grpSpPr/>
+      <p:pic>
+        <p:nvPicPr>
+          <p:cNvPr id="4" name="图片 3" descr="density"/>
+          <p:cNvPicPr>
+            <a:picLocks noChangeAspect="1"/>
+          </p:cNvPicPr>
+          <p:nvPr/>
+        </p:nvPicPr>
+        <p:blipFill>
+          <a:blip r:embed="rId1"/>
+          <a:stretch>
+            <a:fillRect/>
+          </a:stretch>
+        </p:blipFill>
+        <p:spPr>
+          <a:xfrm>
+            <a:off x="5578475" y="3653790"/>
+            <a:ext cx="4921250" cy="2670175"/>
+          </a:xfrm>
+          <a:prstGeom prst="rect">
+            <a:avLst/>
+          </a:prstGeom>
+        </p:spPr>
+      </p:pic>
+      <p:sp>
+        <p:nvSpPr>
+          <p:cNvPr id="8" name="文本占位符 7"/>
+          <p:cNvSpPr>
+            <a:spLocks noGrp="1"/>
+          </p:cNvSpPr>
+          <p:nvPr>
+            <p:ph type="body" sz="half" idx="2"/>
+          </p:nvPr>
+        </p:nvSpPr>
+        <p:spPr>
+          <a:xfrm>
+            <a:off x="840105" y="2057400"/>
+            <a:ext cx="4738370" cy="3221990"/>
+          </a:xfrm>
+        </p:spPr>
+        <p:txBody>
+          <a:bodyPr>
+            <a:normAutofit lnSpcReduction="20000"/>
+          </a:bodyPr>
+          <a:p>
+            <a:r>
+              <a:rPr lang="en-US" altLang="zh-CN" sz="1600"/>
+              <a:t>Electron density ~100/cc</a:t>
+            </a:r>
+            <a:endParaRPr lang="en-US" altLang="zh-CN" sz="1600"/>
+          </a:p>
+          <a:p>
+            <a:endParaRPr lang="en-US" altLang="zh-CN" sz="1600"/>
+          </a:p>
+          <a:p>
+            <a:endParaRPr lang="en-US" altLang="zh-CN" sz="1600"/>
+          </a:p>
+          <a:p>
+            <a:pPr marL="0" indent="0">
+              <a:buNone/>
+            </a:pPr>
+            <a:endParaRPr lang="en-US" altLang="zh-CN" sz="1600"/>
+          </a:p>
+        </p:txBody>
+      </p:sp>
+      <p:graphicFrame>
+        <p:nvGraphicFramePr>
+          <p:cNvPr id="5" name="对象 4">
+            <a:hlinkClick r:id="" action="ppaction://ole?verb="/>
+          </p:cNvPr>
+          <p:cNvGraphicFramePr>
+            <a:graphicFrameLocks noChangeAspect="1"/>
+          </p:cNvGraphicFramePr>
+          <p:nvPr/>
+        </p:nvGraphicFramePr>
+        <p:xfrm>
+          <a:off x="1413193" y="2567940"/>
+          <a:ext cx="6220460" cy="393065"/>
+        </p:xfrm>
+        <a:graphic>
+          <a:graphicData uri="http://schemas.openxmlformats.org/presentationml/2006/ole">
+            <mc:AlternateContent xmlns:mc="http://schemas.openxmlformats.org/markup-compatibility/2006">
+              <mc:Choice xmlns:v="urn:schemas-microsoft-com:vml" Requires="v">
+                <p:oleObj spid="_x0000_s2049" name="" r:id="rId2" imgW="3619500" imgH="228600" progId="Equation.KSEE3">
+                  <p:embed/>
+                </p:oleObj>
+              </mc:Choice>
+              <mc:Fallback>
+                <p:oleObj name="" r:id="rId2" imgW="3619500" imgH="228600" progId="Equation.KSEE3">
+                  <p:embed/>
+                  <p:pic>
+                    <p:nvPicPr>
+                      <p:cNvPr id="0" name="图片 2048"/>
+                      <p:cNvPicPr/>
+                      <p:nvPr/>
+                    </p:nvPicPr>
+                    <p:blipFill>
+                      <a:blip r:embed="rId3"/>
+                      <a:stretch>
+                        <a:fillRect/>
+                      </a:stretch>
+                    </p:blipFill>
+                    <p:spPr>
+                      <a:xfrm>
+                        <a:off x="1413193" y="2567940"/>
+                        <a:ext cx="6220460" cy="393065"/>
+                      </a:xfrm>
+                      <a:prstGeom prst="rect">
+                        <a:avLst/>
+                      </a:prstGeom>
+                    </p:spPr>
+                  </p:pic>
+                </p:oleObj>
+              </mc:Fallback>
+            </mc:AlternateContent>
+          </a:graphicData>
+        </a:graphic>
+      </p:graphicFrame>
+      <p:graphicFrame>
+        <p:nvGraphicFramePr>
+          <p:cNvPr id="6" name="对象 5">
+            <a:hlinkClick r:id="" action="ppaction://ole?verb="/>
+          </p:cNvPr>
+          <p:cNvGraphicFramePr>
+            <a:graphicFrameLocks noChangeAspect="1"/>
+          </p:cNvGraphicFramePr>
+          <p:nvPr/>
+        </p:nvGraphicFramePr>
+        <p:xfrm>
+          <a:off x="1361440" y="2961005"/>
+          <a:ext cx="5192395" cy="426720"/>
+        </p:xfrm>
+        <a:graphic>
+          <a:graphicData uri="http://schemas.openxmlformats.org/presentationml/2006/ole">
+            <mc:AlternateContent xmlns:mc="http://schemas.openxmlformats.org/markup-compatibility/2006">
+              <mc:Choice xmlns:v="urn:schemas-microsoft-com:vml" Requires="v">
+                <p:oleObj spid="_x0000_s2050" name="" r:id="rId4" imgW="2781300" imgH="228600" progId="Equation.KSEE3">
+                  <p:embed/>
+                </p:oleObj>
+              </mc:Choice>
+              <mc:Fallback>
+                <p:oleObj name="" r:id="rId4" imgW="2781300" imgH="228600" progId="Equation.KSEE3">
+                  <p:embed/>
+                  <p:pic>
+                    <p:nvPicPr>
+                      <p:cNvPr id="0" name="图片 2049"/>
+                      <p:cNvPicPr/>
+                      <p:nvPr/>
+                    </p:nvPicPr>
+                    <p:blipFill>
+                      <a:blip r:embed="rId5"/>
+                      <a:stretch>
+                        <a:fillRect/>
+                      </a:stretch>
+                    </p:blipFill>
+                    <p:spPr>
+                      <a:xfrm>
+                        <a:off x="1361440" y="2961005"/>
+                        <a:ext cx="5192395" cy="426720"/>
+                      </a:xfrm>
+                      <a:prstGeom prst="rect">
+                        <a:avLst/>
+                      </a:prstGeom>
+                    </p:spPr>
+                  </p:pic>
+                </p:oleObj>
+              </mc:Fallback>
+            </mc:AlternateContent>
+          </a:graphicData>
+        </a:graphic>
+      </p:graphicFrame>
+      <p:sp>
+        <p:nvSpPr>
+          <p:cNvPr id="7" name="标题 6"/>
+          <p:cNvSpPr>
+            <a:spLocks noGrp="1"/>
+          </p:cNvSpPr>
+          <p:nvPr>
+            <p:ph type="title"/>
+          </p:nvPr>
+        </p:nvSpPr>
+        <p:spPr>
+          <a:xfrm>
+            <a:off x="840105" y="457200"/>
+            <a:ext cx="6234430" cy="1600200"/>
+          </a:xfrm>
+        </p:spPr>
+        <p:txBody>
+          <a:bodyPr/>
+          <a:p>
+            <a:r>
+              <a:rPr lang="en-US" altLang="zh-CN" sz="3200"/>
+              <a:t>Rate analysis for water molecules</a:t>
+            </a:r>
+            <a:endParaRPr lang="en-US" altLang="zh-CN" sz="3200"/>
+          </a:p>
+        </p:txBody>
+      </p:sp>
+      <p:sp>
+        <p:nvSpPr>
+          <p:cNvPr id="9" name="文本框 8"/>
+          <p:cNvSpPr txBox="1"/>
+          <p:nvPr/>
+        </p:nvSpPr>
+        <p:spPr>
+          <a:xfrm>
+            <a:off x="934720" y="5740400"/>
+            <a:ext cx="4130040" cy="583565"/>
+          </a:xfrm>
+          <a:prstGeom prst="rect">
+            <a:avLst/>
+          </a:prstGeom>
+          <a:noFill/>
+        </p:spPr>
+        <p:txBody>
+          <a:bodyPr wrap="square" rtlCol="0">
+            <a:spAutoFit/>
+          </a:bodyPr>
+          <a:p>
+            <a:r>
+              <a:rPr lang="en-US" altLang="zh-CN" sz="1600"/>
+              <a:t>(</a:t>
+            </a:r>
+            <a:r>
+              <a:rPr lang="zh-CN" altLang="en-US" sz="1600"/>
+              <a:t>MultiInstrument Analysis Of Electron Populations In Saturns Magnetosphere</a:t>
+            </a:r>
+            <a:r>
+              <a:rPr lang="en-US" altLang="zh-CN" sz="1600"/>
+              <a:t>, 2008)</a:t>
+            </a:r>
+            <a:endParaRPr lang="en-US" altLang="zh-CN" sz="1600"/>
           </a:p>
         </p:txBody>
       </p:sp>

</xml_diff>

<commit_message>
update ppt for week 4
</commit_message>
<xml_diff>
--- a/week4/Photodetachment Rate at Saturn - Draft.pptx
+++ b/week4/Photodetachment Rate at Saturn - Draft.pptx
@@ -5796,8 +5796,8 @@
         </p:blipFill>
         <p:spPr>
           <a:xfrm>
-            <a:off x="5578475" y="3653790"/>
-            <a:ext cx="4921250" cy="2670175"/>
+            <a:off x="7362190" y="4072255"/>
+            <a:ext cx="4245610" cy="2303780"/>
           </a:xfrm>
           <a:prstGeom prst="rect">
             <a:avLst/>
@@ -5829,6 +5829,9 @@
               <a:rPr lang="en-US" altLang="zh-CN" sz="1600"/>
               <a:t>Electron density ~100/cc</a:t>
             </a:r>
+            <a:endParaRPr lang="en-US" altLang="zh-CN" sz="1600"/>
+          </a:p>
+          <a:p>
             <a:endParaRPr lang="en-US" altLang="zh-CN" sz="1600"/>
           </a:p>
           <a:p>
@@ -5856,19 +5859,19 @@
           <p:nvPr/>
         </p:nvGraphicFramePr>
         <p:xfrm>
-          <a:off x="1413193" y="2567940"/>
-          <a:ext cx="6220460" cy="393065"/>
+          <a:off x="1415415" y="2620010"/>
+          <a:ext cx="6111875" cy="393065"/>
         </p:xfrm>
         <a:graphic>
           <a:graphicData uri="http://schemas.openxmlformats.org/presentationml/2006/ole">
             <mc:AlternateContent xmlns:mc="http://schemas.openxmlformats.org/markup-compatibility/2006">
               <mc:Choice xmlns:v="urn:schemas-microsoft-com:vml" Requires="v">
-                <p:oleObj spid="_x0000_s2049" name="" r:id="rId2" imgW="3619500" imgH="228600" progId="Equation.KSEE3">
+                <p:oleObj spid="_x0000_s2049" name="" r:id="rId2" imgW="3556000" imgH="228600" progId="Equation.KSEE3">
                   <p:embed/>
                 </p:oleObj>
               </mc:Choice>
               <mc:Fallback>
-                <p:oleObj name="" r:id="rId2" imgW="3619500" imgH="228600" progId="Equation.KSEE3">
+                <p:oleObj name="" r:id="rId2" imgW="3556000" imgH="228600" progId="Equation.KSEE3">
                   <p:embed/>
                   <p:pic>
                     <p:nvPicPr>
@@ -5884,8 +5887,8 @@
                     </p:blipFill>
                     <p:spPr>
                       <a:xfrm>
-                        <a:off x="1413193" y="2567940"/>
-                        <a:ext cx="6220460" cy="393065"/>
+                        <a:off x="1415415" y="2620010"/>
+                        <a:ext cx="6111875" cy="393065"/>
                       </a:xfrm>
                       <a:prstGeom prst="rect">
                         <a:avLst/>
@@ -5909,19 +5912,19 @@
           <p:nvPr/>
         </p:nvGraphicFramePr>
         <p:xfrm>
-          <a:off x="1361440" y="2961005"/>
-          <a:ext cx="5192395" cy="426720"/>
+          <a:off x="1415415" y="3013075"/>
+          <a:ext cx="6638925" cy="426720"/>
         </p:xfrm>
         <a:graphic>
           <a:graphicData uri="http://schemas.openxmlformats.org/presentationml/2006/ole">
             <mc:AlternateContent xmlns:mc="http://schemas.openxmlformats.org/markup-compatibility/2006">
               <mc:Choice xmlns:v="urn:schemas-microsoft-com:vml" Requires="v">
-                <p:oleObj spid="_x0000_s2050" name="" r:id="rId4" imgW="2781300" imgH="228600" progId="Equation.KSEE3">
+                <p:oleObj spid="_x0000_s2050" name="" r:id="rId4" imgW="3556000" imgH="228600" progId="Equation.KSEE3">
                   <p:embed/>
                 </p:oleObj>
               </mc:Choice>
               <mc:Fallback>
-                <p:oleObj name="" r:id="rId4" imgW="2781300" imgH="228600" progId="Equation.KSEE3">
+                <p:oleObj name="" r:id="rId4" imgW="3556000" imgH="228600" progId="Equation.KSEE3">
                   <p:embed/>
                   <p:pic>
                     <p:nvPicPr>
@@ -5937,8 +5940,8 @@
                     </p:blipFill>
                     <p:spPr>
                       <a:xfrm>
-                        <a:off x="1361440" y="2961005"/>
-                        <a:ext cx="5192395" cy="426720"/>
+                        <a:off x="1415415" y="3013075"/>
+                        <a:ext cx="6638925" cy="426720"/>
                       </a:xfrm>
                       <a:prstGeom prst="rect">
                         <a:avLst/>
@@ -6015,6 +6018,112 @@
           </a:p>
         </p:txBody>
       </p:sp>
+      <p:graphicFrame>
+        <p:nvGraphicFramePr>
+          <p:cNvPr id="3" name="对象 2">
+            <a:hlinkClick r:id="" action="ppaction://ole?verb="/>
+          </p:cNvPr>
+          <p:cNvGraphicFramePr>
+            <a:graphicFrameLocks noChangeAspect="1"/>
+          </p:cNvGraphicFramePr>
+          <p:nvPr/>
+        </p:nvGraphicFramePr>
+        <p:xfrm>
+          <a:off x="5638800" y="3321050"/>
+          <a:ext cx="914400" cy="215900"/>
+        </p:xfrm>
+        <a:graphic>
+          <a:graphicData uri="http://schemas.openxmlformats.org/presentationml/2006/ole">
+            <mc:AlternateContent xmlns:mc="http://schemas.openxmlformats.org/markup-compatibility/2006">
+              <mc:Choice xmlns:v="urn:schemas-microsoft-com:vml" Requires="v">
+                <p:oleObj spid="_x0000_s1026" name="" r:id="rId6" imgW="914400" imgH="215900" progId="Equation.KSEE3">
+                  <p:embed/>
+                </p:oleObj>
+              </mc:Choice>
+              <mc:Fallback>
+                <p:oleObj name="" r:id="rId6" imgW="914400" imgH="215900" progId="Equation.KSEE3">
+                  <p:embed/>
+                  <p:pic>
+                    <p:nvPicPr>
+                      <p:cNvPr id="0" name="图片 1025"/>
+                      <p:cNvPicPr/>
+                      <p:nvPr/>
+                    </p:nvPicPr>
+                    <p:blipFill>
+                      <a:blip r:embed="rId7"/>
+                      <a:stretch>
+                        <a:fillRect/>
+                      </a:stretch>
+                    </p:blipFill>
+                    <p:spPr>
+                      <a:xfrm>
+                        <a:off x="5638800" y="3321050"/>
+                        <a:ext cx="914400" cy="215900"/>
+                      </a:xfrm>
+                      <a:prstGeom prst="rect">
+                        <a:avLst/>
+                      </a:prstGeom>
+                    </p:spPr>
+                  </p:pic>
+                </p:oleObj>
+              </mc:Fallback>
+            </mc:AlternateContent>
+          </a:graphicData>
+        </a:graphic>
+      </p:graphicFrame>
+      <p:graphicFrame>
+        <p:nvGraphicFramePr>
+          <p:cNvPr id="10" name="对象 9">
+            <a:hlinkClick r:id="" action="ppaction://ole?verb="/>
+          </p:cNvPr>
+          <p:cNvGraphicFramePr>
+            <a:graphicFrameLocks noChangeAspect="1"/>
+          </p:cNvGraphicFramePr>
+          <p:nvPr/>
+        </p:nvGraphicFramePr>
+        <p:xfrm>
+          <a:off x="1415415" y="3455035"/>
+          <a:ext cx="8884285" cy="422910"/>
+        </p:xfrm>
+        <a:graphic>
+          <a:graphicData uri="http://schemas.openxmlformats.org/presentationml/2006/ole">
+            <mc:AlternateContent xmlns:mc="http://schemas.openxmlformats.org/markup-compatibility/2006">
+              <mc:Choice xmlns:v="urn:schemas-microsoft-com:vml" Requires="v">
+                <p:oleObj spid="_x0000_s11" name="" r:id="rId8" imgW="4800600" imgH="228600" progId="Equation.KSEE3">
+                  <p:embed/>
+                </p:oleObj>
+              </mc:Choice>
+              <mc:Fallback>
+                <p:oleObj name="" r:id="rId8" imgW="4800600" imgH="228600" progId="Equation.KSEE3">
+                  <p:embed/>
+                  <p:pic>
+                    <p:nvPicPr>
+                      <p:cNvPr id="0" name="图片 2049"/>
+                      <p:cNvPicPr/>
+                      <p:nvPr/>
+                    </p:nvPicPr>
+                    <p:blipFill>
+                      <a:blip r:embed="rId9"/>
+                      <a:stretch>
+                        <a:fillRect/>
+                      </a:stretch>
+                    </p:blipFill>
+                    <p:spPr>
+                      <a:xfrm>
+                        <a:off x="1415415" y="3455035"/>
+                        <a:ext cx="8884285" cy="422910"/>
+                      </a:xfrm>
+                      <a:prstGeom prst="rect">
+                        <a:avLst/>
+                      </a:prstGeom>
+                    </p:spPr>
+                  </p:pic>
+                </p:oleObj>
+              </mc:Fallback>
+            </mc:AlternateContent>
+          </a:graphicData>
+        </a:graphic>
+      </p:graphicFrame>
     </p:spTree>
   </p:cSld>
   <p:clrMapOvr>

</xml_diff>